<commit_message>
updated doc + coperta
</commit_message>
<xml_diff>
--- a/Documentation/Figures/Șablon.pptx
+++ b/Documentation/Figures/Șablon.pptx
@@ -2639,7 +2639,11 @@
         <a:p>
           <a:r>
             <a:rPr lang="ro-RO" sz="2400" dirty="0" smtClean="0"/>
-            <a:t>Aplicație Server</a:t>
+            <a:t>Aplicație </a:t>
+          </a:r>
+          <a:r>
+            <a:rPr lang="ro-RO" sz="2400" dirty="0" smtClean="0"/>
+            <a:t>Server</a:t>
           </a:r>
           <a:endParaRPr lang="en-US" sz="2400" dirty="0"/>
         </a:p>
@@ -3089,45 +3093,45 @@
     </dgm:pt>
   </dgm:ptLst>
   <dgm:cxnLst>
-    <dgm:cxn modelId="{9CECA818-D527-4FE0-919E-C19006374085}" type="presOf" srcId="{5C4DE19C-A716-4E24-865A-871D15A6106C}" destId="{98778A9B-C700-42DB-8B31-295727FCB770}" srcOrd="0" destOrd="0" presId="urn:microsoft.com/office/officeart/2005/8/layout/hierarchy6"/>
-    <dgm:cxn modelId="{418B5CB2-8F43-48C1-8199-E6DE90661697}" type="presOf" srcId="{34A3A509-B82F-404C-8687-6E3B1937BBEE}" destId="{E68F78C2-FCC0-473C-8802-5A0A0CB2C679}" srcOrd="0" destOrd="0" presId="urn:microsoft.com/office/officeart/2005/8/layout/hierarchy6"/>
-    <dgm:cxn modelId="{7E254444-F2AB-4E1F-B2A0-F03155BFBFF5}" srcId="{2A0496EF-31A8-4FB8-8A7F-A2CBF8606691}" destId="{2F5A44C0-791D-41F6-AE89-A8AF91720298}" srcOrd="0" destOrd="0" parTransId="{1512B27A-390D-4709-8629-FCA8BEDE4660}" sibTransId="{27C39707-0CBF-4DAD-967E-14A0F8212F79}"/>
-    <dgm:cxn modelId="{07075BE4-1887-4775-8F41-989EDCB308BF}" type="presOf" srcId="{30049703-D785-45D5-9086-D41CD69E5E8B}" destId="{D52E9823-1814-4F22-988A-F8D4598EB50D}" srcOrd="0" destOrd="0" presId="urn:microsoft.com/office/officeart/2005/8/layout/hierarchy6"/>
-    <dgm:cxn modelId="{BD788C0F-E087-4B94-A180-E6C511057C18}" type="presOf" srcId="{8B05A671-0DE7-4C81-B7BE-EFEF4D8B285A}" destId="{1956AAFF-10E4-4255-8BD5-2F66FE8CA411}" srcOrd="0" destOrd="0" presId="urn:microsoft.com/office/officeart/2005/8/layout/hierarchy6"/>
+    <dgm:cxn modelId="{DFA0B2A2-59B8-4745-9561-49A9AC52E211}" type="presOf" srcId="{E4233A6D-7415-438D-8FDD-390A966DAF61}" destId="{AC8DB091-B58F-49E6-9A89-C4137BD364D0}" srcOrd="0" destOrd="0" presId="urn:microsoft.com/office/officeart/2005/8/layout/hierarchy6"/>
+    <dgm:cxn modelId="{BDB714D0-302E-4D8E-A146-143209CB7EB9}" type="presOf" srcId="{2A0496EF-31A8-4FB8-8A7F-A2CBF8606691}" destId="{7E20B0C3-8A2C-4390-90B0-51E9C4628327}" srcOrd="0" destOrd="0" presId="urn:microsoft.com/office/officeart/2005/8/layout/hierarchy6"/>
+    <dgm:cxn modelId="{84AEBEDF-699D-409C-8FDF-39B8F2078832}" type="presOf" srcId="{2F5A44C0-791D-41F6-AE89-A8AF91720298}" destId="{924D7767-3779-4E75-A9D1-B6EF723A406B}" srcOrd="0" destOrd="0" presId="urn:microsoft.com/office/officeart/2005/8/layout/hierarchy6"/>
     <dgm:cxn modelId="{EB236707-065C-4D1D-B076-86AEC5CEEB91}" srcId="{8B05A671-0DE7-4C81-B7BE-EFEF4D8B285A}" destId="{0F5FC267-C6FA-4018-82E4-6D1E0CF53473}" srcOrd="0" destOrd="0" parTransId="{5F0C85A7-67E4-42A9-A5B9-AB21F3F7D118}" sibTransId="{A7305806-DFE5-445A-9309-3C585AF24235}"/>
-    <dgm:cxn modelId="{08D78291-1718-4BC8-86C8-91374E503D0A}" type="presOf" srcId="{6F4FF149-A6CE-41B1-AE4F-203882021B4B}" destId="{99882D7B-548B-49ED-8D25-B2C5E6BB0792}" srcOrd="0" destOrd="0" presId="urn:microsoft.com/office/officeart/2005/8/layout/hierarchy6"/>
-    <dgm:cxn modelId="{C6BBB91B-D864-4683-B753-01DB05FA3F69}" type="presOf" srcId="{CE3A7A2B-0120-4596-8CB3-B686980D22EA}" destId="{0EBCFE24-6A1E-417D-87CE-35AF58869832}" srcOrd="0" destOrd="0" presId="urn:microsoft.com/office/officeart/2005/8/layout/hierarchy6"/>
-    <dgm:cxn modelId="{0667E768-73F9-4898-A480-9B6CDA8EA0A1}" type="presOf" srcId="{42ED198D-698B-41D5-96D0-11D7162BABC1}" destId="{F8775318-346A-4AC7-9707-6144772C35D5}" srcOrd="0" destOrd="0" presId="urn:microsoft.com/office/officeart/2005/8/layout/hierarchy6"/>
-    <dgm:cxn modelId="{281E5842-A5EC-45F4-84F1-613FD73DE8AA}" type="presOf" srcId="{F115A2BD-1E7A-4B98-BA46-8A3FF6432199}" destId="{9C7D0A91-8C5C-4FD7-8EB9-A2426F718068}" srcOrd="0" destOrd="0" presId="urn:microsoft.com/office/officeart/2005/8/layout/hierarchy6"/>
-    <dgm:cxn modelId="{118EEE52-5EF9-489B-961A-2CA4C78AC153}" srcId="{2F5A44C0-791D-41F6-AE89-A8AF91720298}" destId="{BB8C4245-B896-463C-9F6D-6089A25906F7}" srcOrd="0" destOrd="0" parTransId="{20707547-4CCB-4CCC-A7B6-76B2B1A97837}" sibTransId="{339F42B9-B5A2-493A-8ACA-FF560690E9EC}"/>
+    <dgm:cxn modelId="{6F58FB3E-AA2A-4594-A1AD-4B37C53642A9}" type="presOf" srcId="{9DF1D68F-2B3E-4268-8AFD-0D98C0209666}" destId="{389F7A8F-AE74-4137-84FF-3105FFB8A33B}" srcOrd="0" destOrd="0" presId="urn:microsoft.com/office/officeart/2005/8/layout/hierarchy6"/>
     <dgm:cxn modelId="{02264204-A44F-4440-BCAE-58C7345FA323}" type="presOf" srcId="{A3948582-E41B-4E64-96CC-A7B8352B50FD}" destId="{34A782E1-AFD9-4879-8F28-FD40976DEF5C}" srcOrd="0" destOrd="0" presId="urn:microsoft.com/office/officeart/2005/8/layout/hierarchy6"/>
     <dgm:cxn modelId="{A1698EF7-4B92-45E0-ABD2-C3C9D2496C05}" srcId="{CE3A7A2B-0120-4596-8CB3-B686980D22EA}" destId="{2A0496EF-31A8-4FB8-8A7F-A2CBF8606691}" srcOrd="0" destOrd="0" parTransId="{34A3A509-B82F-404C-8687-6E3B1937BBEE}" sibTransId="{711EDAB4-B415-4A58-84DA-A2ADED836DE6}"/>
+    <dgm:cxn modelId="{B5855E00-4E6E-4E7C-84C8-9CC496C04A8D}" type="presOf" srcId="{2E1BB674-35BC-45BB-9673-67B940055B31}" destId="{05786130-55A6-41D7-9FFE-9F45D3899688}" srcOrd="0" destOrd="0" presId="urn:microsoft.com/office/officeart/2005/8/layout/hierarchy6"/>
+    <dgm:cxn modelId="{9CECA818-D527-4FE0-919E-C19006374085}" type="presOf" srcId="{5C4DE19C-A716-4E24-865A-871D15A6106C}" destId="{98778A9B-C700-42DB-8B31-295727FCB770}" srcOrd="0" destOrd="0" presId="urn:microsoft.com/office/officeart/2005/8/layout/hierarchy6"/>
+    <dgm:cxn modelId="{442D9682-DD1F-48FB-B407-434E123177AC}" type="presOf" srcId="{02CFAFD5-A585-4FF0-AD27-9E6537265522}" destId="{A3A32269-1CAF-4DC2-B4D7-72FD83E37B5B}" srcOrd="0" destOrd="0" presId="urn:microsoft.com/office/officeart/2005/8/layout/hierarchy6"/>
+    <dgm:cxn modelId="{281E5842-A5EC-45F4-84F1-613FD73DE8AA}" type="presOf" srcId="{F115A2BD-1E7A-4B98-BA46-8A3FF6432199}" destId="{9C7D0A91-8C5C-4FD7-8EB9-A2426F718068}" srcOrd="0" destOrd="0" presId="urn:microsoft.com/office/officeart/2005/8/layout/hierarchy6"/>
+    <dgm:cxn modelId="{0D0FBA14-6749-470B-A6B1-11AF98DD40A2}" type="presOf" srcId="{C6292CA7-7F2C-457B-824C-FDAD1A300612}" destId="{2122F150-D109-449A-8204-7E319E4F5DAA}" srcOrd="0" destOrd="0" presId="urn:microsoft.com/office/officeart/2005/8/layout/hierarchy6"/>
+    <dgm:cxn modelId="{118EEE52-5EF9-489B-961A-2CA4C78AC153}" srcId="{2F5A44C0-791D-41F6-AE89-A8AF91720298}" destId="{BB8C4245-B896-463C-9F6D-6089A25906F7}" srcOrd="0" destOrd="0" parTransId="{20707547-4CCB-4CCC-A7B6-76B2B1A97837}" sibTransId="{339F42B9-B5A2-493A-8ACA-FF560690E9EC}"/>
+    <dgm:cxn modelId="{7E254444-F2AB-4E1F-B2A0-F03155BFBFF5}" srcId="{2A0496EF-31A8-4FB8-8A7F-A2CBF8606691}" destId="{2F5A44C0-791D-41F6-AE89-A8AF91720298}" srcOrd="0" destOrd="0" parTransId="{1512B27A-390D-4709-8629-FCA8BEDE4660}" sibTransId="{27C39707-0CBF-4DAD-967E-14A0F8212F79}"/>
+    <dgm:cxn modelId="{F91052DF-FAD6-4169-A99B-BB91E6FE48CD}" srcId="{2F5A44C0-791D-41F6-AE89-A8AF91720298}" destId="{5C4DE19C-A716-4E24-865A-871D15A6106C}" srcOrd="2" destOrd="0" parTransId="{ED55D2DB-BE73-4F1D-90F6-D0461196D166}" sibTransId="{B842B66A-0CB8-48E1-B230-01504D47AD13}"/>
     <dgm:cxn modelId="{7DAA723A-1CE3-49C2-B8CB-FB0D95B0DACC}" type="presOf" srcId="{A28646E1-B33F-4FF4-9877-08DED234ED89}" destId="{8C7EEA08-EF08-4AD9-9C21-35B928AE57CA}" srcOrd="0" destOrd="0" presId="urn:microsoft.com/office/officeart/2005/8/layout/hierarchy6"/>
+    <dgm:cxn modelId="{DD6ED853-DFB6-4D4E-AAFF-9BA2955F65B3}" type="presOf" srcId="{0F5FC267-C6FA-4018-82E4-6D1E0CF53473}" destId="{31B4494D-E553-4E42-BC59-010A49910B4D}" srcOrd="0" destOrd="0" presId="urn:microsoft.com/office/officeart/2005/8/layout/hierarchy6"/>
+    <dgm:cxn modelId="{418B5CB2-8F43-48C1-8199-E6DE90661697}" type="presOf" srcId="{34A3A509-B82F-404C-8687-6E3B1937BBEE}" destId="{E68F78C2-FCC0-473C-8802-5A0A0CB2C679}" srcOrd="0" destOrd="0" presId="urn:microsoft.com/office/officeart/2005/8/layout/hierarchy6"/>
+    <dgm:cxn modelId="{C4F33C3F-965D-4E83-8D38-1174A8666C11}" type="presOf" srcId="{BB8C4245-B896-463C-9F6D-6089A25906F7}" destId="{9310C464-F17A-4EE5-9628-6BEBE30D390D}" srcOrd="0" destOrd="0" presId="urn:microsoft.com/office/officeart/2005/8/layout/hierarchy6"/>
+    <dgm:cxn modelId="{C58A26B1-320E-40AF-910A-81FF791114BD}" type="presOf" srcId="{20707547-4CCB-4CCC-A7B6-76B2B1A97837}" destId="{D963691C-3642-4A13-9D4B-615A02507769}" srcOrd="0" destOrd="0" presId="urn:microsoft.com/office/officeart/2005/8/layout/hierarchy6"/>
+    <dgm:cxn modelId="{C6BBB91B-D864-4683-B753-01DB05FA3F69}" type="presOf" srcId="{CE3A7A2B-0120-4596-8CB3-B686980D22EA}" destId="{0EBCFE24-6A1E-417D-87CE-35AF58869832}" srcOrd="0" destOrd="0" presId="urn:microsoft.com/office/officeart/2005/8/layout/hierarchy6"/>
+    <dgm:cxn modelId="{07075BE4-1887-4775-8F41-989EDCB308BF}" type="presOf" srcId="{30049703-D785-45D5-9086-D41CD69E5E8B}" destId="{D52E9823-1814-4F22-988A-F8D4598EB50D}" srcOrd="0" destOrd="0" presId="urn:microsoft.com/office/officeart/2005/8/layout/hierarchy6"/>
     <dgm:cxn modelId="{51B12532-E68A-4486-9A3F-B4FE41BA33A3}" type="presOf" srcId="{1512B27A-390D-4709-8629-FCA8BEDE4660}" destId="{1AA2EE3E-A9B5-4A09-AC15-11E53F7E90D0}" srcOrd="0" destOrd="0" presId="urn:microsoft.com/office/officeart/2005/8/layout/hierarchy6"/>
+    <dgm:cxn modelId="{EF1D9E71-A555-408C-8B53-311EDD8AFEC0}" srcId="{A28646E1-B33F-4FF4-9877-08DED234ED89}" destId="{C6292CA7-7F2C-457B-824C-FDAD1A300612}" srcOrd="0" destOrd="0" parTransId="{6797477D-2FBC-4C66-B693-B1358AD756A9}" sibTransId="{EA639A36-FBDA-4389-88D6-486CC80E92FD}"/>
+    <dgm:cxn modelId="{F31620ED-FE40-41B8-9A92-2F0DECEB045F}" srcId="{2F5A44C0-791D-41F6-AE89-A8AF91720298}" destId="{A28646E1-B33F-4FF4-9877-08DED234ED89}" srcOrd="4" destOrd="0" parTransId="{30049703-D785-45D5-9086-D41CD69E5E8B}" sibTransId="{DAFD1E16-BC67-489D-8D3E-B04961C23619}"/>
+    <dgm:cxn modelId="{08D78291-1718-4BC8-86C8-91374E503D0A}" type="presOf" srcId="{6F4FF149-A6CE-41B1-AE4F-203882021B4B}" destId="{99882D7B-548B-49ED-8D25-B2C5E6BB0792}" srcOrd="0" destOrd="0" presId="urn:microsoft.com/office/officeart/2005/8/layout/hierarchy6"/>
+    <dgm:cxn modelId="{0667E768-73F9-4898-A480-9B6CDA8EA0A1}" type="presOf" srcId="{42ED198D-698B-41D5-96D0-11D7162BABC1}" destId="{F8775318-346A-4AC7-9707-6144772C35D5}" srcOrd="0" destOrd="0" presId="urn:microsoft.com/office/officeart/2005/8/layout/hierarchy6"/>
+    <dgm:cxn modelId="{34FED145-F186-405B-B467-025CCF264B4C}" srcId="{5C4DE19C-A716-4E24-865A-871D15A6106C}" destId="{63376BF1-6687-43EE-ADA3-D36BAEFB7DEE}" srcOrd="0" destOrd="0" parTransId="{E4233A6D-7415-438D-8FDD-390A966DAF61}" sibTransId="{DEA88744-D54F-46A0-AC82-2F6C542D45AE}"/>
+    <dgm:cxn modelId="{BD788C0F-E087-4B94-A180-E6C511057C18}" type="presOf" srcId="{8B05A671-0DE7-4C81-B7BE-EFEF4D8B285A}" destId="{1956AAFF-10E4-4255-8BD5-2F66FE8CA411}" srcOrd="0" destOrd="0" presId="urn:microsoft.com/office/officeart/2005/8/layout/hierarchy6"/>
+    <dgm:cxn modelId="{630F4EFE-B45A-4F04-A344-E066CF88173B}" type="presOf" srcId="{5F0C85A7-67E4-42A9-A5B9-AB21F3F7D118}" destId="{5150048F-8CE1-41E9-87EB-F85F39971A52}" srcOrd="0" destOrd="0" presId="urn:microsoft.com/office/officeart/2005/8/layout/hierarchy6"/>
+    <dgm:cxn modelId="{9FC108E5-589B-4D33-BE4E-9E562824F9AC}" srcId="{A3948582-E41B-4E64-96CC-A7B8352B50FD}" destId="{CE3A7A2B-0120-4596-8CB3-B686980D22EA}" srcOrd="0" destOrd="0" parTransId="{325C2410-EEE4-475F-8DC3-556367C17848}" sibTransId="{DCCB8526-D7E7-41F0-B75B-247A63F7E4F2}"/>
     <dgm:cxn modelId="{82EAC98A-5ACA-4CC9-8C3F-9F5CEBB95B64}" srcId="{2F5A44C0-791D-41F6-AE89-A8AF91720298}" destId="{2E1BB674-35BC-45BB-9673-67B940055B31}" srcOrd="3" destOrd="0" parTransId="{F115A2BD-1E7A-4B98-BA46-8A3FF6432199}" sibTransId="{E40EF4B0-13FD-46F0-9F17-93B749C56BB4}"/>
-    <dgm:cxn modelId="{F31620ED-FE40-41B8-9A92-2F0DECEB045F}" srcId="{2F5A44C0-791D-41F6-AE89-A8AF91720298}" destId="{A28646E1-B33F-4FF4-9877-08DED234ED89}" srcOrd="4" destOrd="0" parTransId="{30049703-D785-45D5-9086-D41CD69E5E8B}" sibTransId="{DAFD1E16-BC67-489D-8D3E-B04961C23619}"/>
+    <dgm:cxn modelId="{D1ADB1EA-4BB3-49A6-AD72-DC1CB8428524}" srcId="{2E1BB674-35BC-45BB-9673-67B940055B31}" destId="{1B41352A-2EA7-4FF6-9968-BC030163D094}" srcOrd="0" destOrd="0" parTransId="{42ED198D-698B-41D5-96D0-11D7162BABC1}" sibTransId="{5A46E43D-4ADE-4B51-BA3E-17CBEA03D9A7}"/>
     <dgm:cxn modelId="{24B89DA9-AFAD-4CFC-9AFC-4D95741AC436}" type="presOf" srcId="{ED55D2DB-BE73-4F1D-90F6-D0461196D166}" destId="{EB93688B-C590-459D-A823-880B4C0DE7A9}" srcOrd="0" destOrd="0" presId="urn:microsoft.com/office/officeart/2005/8/layout/hierarchy6"/>
-    <dgm:cxn modelId="{F91052DF-FAD6-4169-A99B-BB91E6FE48CD}" srcId="{2F5A44C0-791D-41F6-AE89-A8AF91720298}" destId="{5C4DE19C-A716-4E24-865A-871D15A6106C}" srcOrd="2" destOrd="0" parTransId="{ED55D2DB-BE73-4F1D-90F6-D0461196D166}" sibTransId="{B842B66A-0CB8-48E1-B230-01504D47AD13}"/>
-    <dgm:cxn modelId="{BDB714D0-302E-4D8E-A146-143209CB7EB9}" type="presOf" srcId="{2A0496EF-31A8-4FB8-8A7F-A2CBF8606691}" destId="{7E20B0C3-8A2C-4390-90B0-51E9C4628327}" srcOrd="0" destOrd="0" presId="urn:microsoft.com/office/officeart/2005/8/layout/hierarchy6"/>
-    <dgm:cxn modelId="{EF1D9E71-A555-408C-8B53-311EDD8AFEC0}" srcId="{A28646E1-B33F-4FF4-9877-08DED234ED89}" destId="{C6292CA7-7F2C-457B-824C-FDAD1A300612}" srcOrd="0" destOrd="0" parTransId="{6797477D-2FBC-4C66-B693-B1358AD756A9}" sibTransId="{EA639A36-FBDA-4389-88D6-486CC80E92FD}"/>
-    <dgm:cxn modelId="{9FC108E5-589B-4D33-BE4E-9E562824F9AC}" srcId="{A3948582-E41B-4E64-96CC-A7B8352B50FD}" destId="{CE3A7A2B-0120-4596-8CB3-B686980D22EA}" srcOrd="0" destOrd="0" parTransId="{325C2410-EEE4-475F-8DC3-556367C17848}" sibTransId="{DCCB8526-D7E7-41F0-B75B-247A63F7E4F2}"/>
+    <dgm:cxn modelId="{466EAACD-FEB0-407D-98EB-C67C4904C4D9}" srcId="{2F5A44C0-791D-41F6-AE89-A8AF91720298}" destId="{8B05A671-0DE7-4C81-B7BE-EFEF4D8B285A}" srcOrd="1" destOrd="0" parTransId="{02CFAFD5-A585-4FF0-AD27-9E6537265522}" sibTransId="{EB08C90F-DB27-43A1-986B-3F70646A2D51}"/>
+    <dgm:cxn modelId="{F070D942-9F3D-4F57-9CFE-BFC88E7801DA}" type="presOf" srcId="{1B41352A-2EA7-4FF6-9968-BC030163D094}" destId="{B62A4414-83F8-46D3-8330-4FC9C5171295}" srcOrd="0" destOrd="0" presId="urn:microsoft.com/office/officeart/2005/8/layout/hierarchy6"/>
+    <dgm:cxn modelId="{947130EA-0F23-4FE5-9267-E0D2A9DB1EB6}" srcId="{BB8C4245-B896-463C-9F6D-6089A25906F7}" destId="{6F4FF149-A6CE-41B1-AE4F-203882021B4B}" srcOrd="0" destOrd="0" parTransId="{9DF1D68F-2B3E-4268-8AFD-0D98C0209666}" sibTransId="{661E8DE5-3519-455B-9799-EE1CAB41BCAF}"/>
     <dgm:cxn modelId="{6A982B11-3CCE-4A26-A4C6-8D35256F7E10}" type="presOf" srcId="{6797477D-2FBC-4C66-B693-B1358AD756A9}" destId="{E5CAF7CA-E25C-4C1C-B864-8B33F7D31AAE}" srcOrd="0" destOrd="0" presId="urn:microsoft.com/office/officeart/2005/8/layout/hierarchy6"/>
-    <dgm:cxn modelId="{84AEBEDF-699D-409C-8FDF-39B8F2078832}" type="presOf" srcId="{2F5A44C0-791D-41F6-AE89-A8AF91720298}" destId="{924D7767-3779-4E75-A9D1-B6EF723A406B}" srcOrd="0" destOrd="0" presId="urn:microsoft.com/office/officeart/2005/8/layout/hierarchy6"/>
-    <dgm:cxn modelId="{34FED145-F186-405B-B467-025CCF264B4C}" srcId="{5C4DE19C-A716-4E24-865A-871D15A6106C}" destId="{63376BF1-6687-43EE-ADA3-D36BAEFB7DEE}" srcOrd="0" destOrd="0" parTransId="{E4233A6D-7415-438D-8FDD-390A966DAF61}" sibTransId="{DEA88744-D54F-46A0-AC82-2F6C542D45AE}"/>
-    <dgm:cxn modelId="{6F58FB3E-AA2A-4594-A1AD-4B37C53642A9}" type="presOf" srcId="{9DF1D68F-2B3E-4268-8AFD-0D98C0209666}" destId="{389F7A8F-AE74-4137-84FF-3105FFB8A33B}" srcOrd="0" destOrd="0" presId="urn:microsoft.com/office/officeart/2005/8/layout/hierarchy6"/>
     <dgm:cxn modelId="{2A455528-482E-4825-98EB-67F715F8E105}" type="presOf" srcId="{63376BF1-6687-43EE-ADA3-D36BAEFB7DEE}" destId="{B288F2FA-C717-48A3-A9F5-9FC1E4AF394C}" srcOrd="0" destOrd="0" presId="urn:microsoft.com/office/officeart/2005/8/layout/hierarchy6"/>
-    <dgm:cxn modelId="{C58A26B1-320E-40AF-910A-81FF791114BD}" type="presOf" srcId="{20707547-4CCB-4CCC-A7B6-76B2B1A97837}" destId="{D963691C-3642-4A13-9D4B-615A02507769}" srcOrd="0" destOrd="0" presId="urn:microsoft.com/office/officeart/2005/8/layout/hierarchy6"/>
-    <dgm:cxn modelId="{D1ADB1EA-4BB3-49A6-AD72-DC1CB8428524}" srcId="{2E1BB674-35BC-45BB-9673-67B940055B31}" destId="{1B41352A-2EA7-4FF6-9968-BC030163D094}" srcOrd="0" destOrd="0" parTransId="{42ED198D-698B-41D5-96D0-11D7162BABC1}" sibTransId="{5A46E43D-4ADE-4B51-BA3E-17CBEA03D9A7}"/>
-    <dgm:cxn modelId="{947130EA-0F23-4FE5-9267-E0D2A9DB1EB6}" srcId="{BB8C4245-B896-463C-9F6D-6089A25906F7}" destId="{6F4FF149-A6CE-41B1-AE4F-203882021B4B}" srcOrd="0" destOrd="0" parTransId="{9DF1D68F-2B3E-4268-8AFD-0D98C0209666}" sibTransId="{661E8DE5-3519-455B-9799-EE1CAB41BCAF}"/>
-    <dgm:cxn modelId="{0D0FBA14-6749-470B-A6B1-11AF98DD40A2}" type="presOf" srcId="{C6292CA7-7F2C-457B-824C-FDAD1A300612}" destId="{2122F150-D109-449A-8204-7E319E4F5DAA}" srcOrd="0" destOrd="0" presId="urn:microsoft.com/office/officeart/2005/8/layout/hierarchy6"/>
-    <dgm:cxn modelId="{C4F33C3F-965D-4E83-8D38-1174A8666C11}" type="presOf" srcId="{BB8C4245-B896-463C-9F6D-6089A25906F7}" destId="{9310C464-F17A-4EE5-9628-6BEBE30D390D}" srcOrd="0" destOrd="0" presId="urn:microsoft.com/office/officeart/2005/8/layout/hierarchy6"/>
-    <dgm:cxn modelId="{DFA0B2A2-59B8-4745-9561-49A9AC52E211}" type="presOf" srcId="{E4233A6D-7415-438D-8FDD-390A966DAF61}" destId="{AC8DB091-B58F-49E6-9A89-C4137BD364D0}" srcOrd="0" destOrd="0" presId="urn:microsoft.com/office/officeart/2005/8/layout/hierarchy6"/>
-    <dgm:cxn modelId="{466EAACD-FEB0-407D-98EB-C67C4904C4D9}" srcId="{2F5A44C0-791D-41F6-AE89-A8AF91720298}" destId="{8B05A671-0DE7-4C81-B7BE-EFEF4D8B285A}" srcOrd="1" destOrd="0" parTransId="{02CFAFD5-A585-4FF0-AD27-9E6537265522}" sibTransId="{EB08C90F-DB27-43A1-986B-3F70646A2D51}"/>
-    <dgm:cxn modelId="{DD6ED853-DFB6-4D4E-AAFF-9BA2955F65B3}" type="presOf" srcId="{0F5FC267-C6FA-4018-82E4-6D1E0CF53473}" destId="{31B4494D-E553-4E42-BC59-010A49910B4D}" srcOrd="0" destOrd="0" presId="urn:microsoft.com/office/officeart/2005/8/layout/hierarchy6"/>
-    <dgm:cxn modelId="{F070D942-9F3D-4F57-9CFE-BFC88E7801DA}" type="presOf" srcId="{1B41352A-2EA7-4FF6-9968-BC030163D094}" destId="{B62A4414-83F8-46D3-8330-4FC9C5171295}" srcOrd="0" destOrd="0" presId="urn:microsoft.com/office/officeart/2005/8/layout/hierarchy6"/>
-    <dgm:cxn modelId="{442D9682-DD1F-48FB-B407-434E123177AC}" type="presOf" srcId="{02CFAFD5-A585-4FF0-AD27-9E6537265522}" destId="{A3A32269-1CAF-4DC2-B4D7-72FD83E37B5B}" srcOrd="0" destOrd="0" presId="urn:microsoft.com/office/officeart/2005/8/layout/hierarchy6"/>
-    <dgm:cxn modelId="{B5855E00-4E6E-4E7C-84C8-9CC496C04A8D}" type="presOf" srcId="{2E1BB674-35BC-45BB-9673-67B940055B31}" destId="{05786130-55A6-41D7-9FFE-9F45D3899688}" srcOrd="0" destOrd="0" presId="urn:microsoft.com/office/officeart/2005/8/layout/hierarchy6"/>
-    <dgm:cxn modelId="{630F4EFE-B45A-4F04-A344-E066CF88173B}" type="presOf" srcId="{5F0C85A7-67E4-42A9-A5B9-AB21F3F7D118}" destId="{5150048F-8CE1-41E9-87EB-F85F39971A52}" srcOrd="0" destOrd="0" presId="urn:microsoft.com/office/officeart/2005/8/layout/hierarchy6"/>
     <dgm:cxn modelId="{B157827E-F4AF-41C0-ACCC-3E51FC913D1A}" type="presParOf" srcId="{34A782E1-AFD9-4879-8F28-FD40976DEF5C}" destId="{23DD04AF-9014-4775-8943-662D040C6072}" srcOrd="0" destOrd="0" presId="urn:microsoft.com/office/officeart/2005/8/layout/hierarchy6"/>
     <dgm:cxn modelId="{CBD25336-E641-4ED6-B5EC-0330BE95EF49}" type="presParOf" srcId="{23DD04AF-9014-4775-8943-662D040C6072}" destId="{2DDC3670-F275-47DC-83E2-1F7471C2ACC3}" srcOrd="0" destOrd="0" presId="urn:microsoft.com/office/officeart/2005/8/layout/hierarchy6"/>
     <dgm:cxn modelId="{62DF30C1-3676-4D78-9E5C-93EA7567C6AA}" type="presParOf" srcId="{2DDC3670-F275-47DC-83E2-1F7471C2ACC3}" destId="{6710931F-E719-46E6-A357-D18D0D5670D3}" srcOrd="0" destOrd="0" presId="urn:microsoft.com/office/officeart/2005/8/layout/hierarchy6"/>
@@ -4047,7 +4051,11 @@
           </a:pPr>
           <a:r>
             <a:rPr lang="ro-RO" sz="2400" kern="1200" dirty="0" smtClean="0"/>
-            <a:t>Aplicație Server</a:t>
+            <a:t>Aplicație </a:t>
+          </a:r>
+          <a:r>
+            <a:rPr lang="ro-RO" sz="2400" kern="1200" dirty="0" smtClean="0"/>
+            <a:t>Server</a:t>
           </a:r>
           <a:endParaRPr lang="en-US" sz="2400" kern="1200" dirty="0"/>
         </a:p>
@@ -12410,7 +12418,7 @@
           <p:nvPr>
             <p:extLst>
               <p:ext uri="{D42A27DB-BD31-4B8C-83A1-F6EECF244321}">
-                <p14:modId xmlns:p14="http://schemas.microsoft.com/office/powerpoint/2010/main" val="1678791606"/>
+                <p14:modId xmlns:p14="http://schemas.microsoft.com/office/powerpoint/2010/main" val="3334663289"/>
               </p:ext>
             </p:extLst>
           </p:nvPr>
@@ -13040,6 +13048,82 @@
           </a:p>
         </p:txBody>
       </p:sp>
+      <p:sp>
+        <p:nvSpPr>
+          <p:cNvPr id="3" name="Rounded Rectangle 2"/>
+          <p:cNvSpPr/>
+          <p:nvPr/>
+        </p:nvSpPr>
+        <p:spPr>
+          <a:xfrm>
+            <a:off x="6702549" y="1883549"/>
+            <a:ext cx="1091622" cy="1120908"/>
+          </a:xfrm>
+          <a:prstGeom prst="roundRect">
+            <a:avLst/>
+          </a:prstGeom>
+        </p:spPr>
+        <p:style>
+          <a:lnRef idx="3">
+            <a:schemeClr val="lt1"/>
+          </a:lnRef>
+          <a:fillRef idx="1">
+            <a:schemeClr val="accent6"/>
+          </a:fillRef>
+          <a:effectRef idx="1">
+            <a:schemeClr val="accent6"/>
+          </a:effectRef>
+          <a:fontRef idx="minor">
+            <a:schemeClr val="lt1"/>
+          </a:fontRef>
+        </p:style>
+        <p:txBody>
+          <a:bodyPr rtlCol="0" anchor="ctr"/>
+          <a:lstStyle/>
+          <a:p>
+            <a:pPr algn="ctr"/>
+            <a:r>
+              <a:rPr lang="ro-RO" dirty="0" smtClean="0"/>
+              <a:t>Bază de date</a:t>
+            </a:r>
+            <a:endParaRPr lang="en-US" dirty="0"/>
+          </a:p>
+        </p:txBody>
+      </p:sp>
+      <p:cxnSp>
+        <p:nvCxnSpPr>
+          <p:cNvPr id="9" name="Straight Arrow Connector 8"/>
+          <p:cNvCxnSpPr/>
+          <p:nvPr/>
+        </p:nvCxnSpPr>
+        <p:spPr>
+          <a:xfrm>
+            <a:off x="6313714" y="2454259"/>
+            <a:ext cx="388835" cy="0"/>
+          </a:xfrm>
+          <a:prstGeom prst="straightConnector1">
+            <a:avLst/>
+          </a:prstGeom>
+          <a:ln>
+            <a:headEnd type="triangle"/>
+            <a:tailEnd type="triangle"/>
+          </a:ln>
+        </p:spPr>
+        <p:style>
+          <a:lnRef idx="3">
+            <a:schemeClr val="accent6"/>
+          </a:lnRef>
+          <a:fillRef idx="0">
+            <a:schemeClr val="accent6"/>
+          </a:fillRef>
+          <a:effectRef idx="2">
+            <a:schemeClr val="accent6"/>
+          </a:effectRef>
+          <a:fontRef idx="minor">
+            <a:schemeClr val="tx1"/>
+          </a:fontRef>
+        </p:style>
+      </p:cxnSp>
     </p:spTree>
     <p:extLst>
       <p:ext uri="{BB962C8B-B14F-4D97-AF65-F5344CB8AC3E}">

</xml_diff>

<commit_message>
review until chapter 3.2.
</commit_message>
<xml_diff>
--- a/Documentation/Figures/Șablon.pptx
+++ b/Documentation/Figures/Șablon.pptx
@@ -2587,7 +2587,11 @@
         <a:p>
           <a:r>
             <a:rPr lang="ro-RO" sz="2100" dirty="0" smtClean="0"/>
-            <a:t>Încuietoare usă</a:t>
+            <a:t>Încuietoare </a:t>
+          </a:r>
+          <a:r>
+            <a:rPr lang="ro-RO" sz="2100" dirty="0" smtClean="0"/>
+            <a:t>ușă</a:t>
           </a:r>
           <a:endParaRPr lang="en-US" sz="2100" dirty="0"/>
         </a:p>
@@ -2639,11 +2643,7 @@
         <a:p>
           <a:r>
             <a:rPr lang="ro-RO" sz="2400" dirty="0" smtClean="0"/>
-            <a:t>Aplicație </a:t>
-          </a:r>
-          <a:r>
-            <a:rPr lang="ro-RO" sz="2400" dirty="0" smtClean="0"/>
-            <a:t>Server</a:t>
+            <a:t>Aplicație Server</a:t>
           </a:r>
           <a:endParaRPr lang="en-US" sz="2400" dirty="0"/>
         </a:p>
@@ -3093,45 +3093,45 @@
     </dgm:pt>
   </dgm:ptLst>
   <dgm:cxnLst>
-    <dgm:cxn modelId="{DFA0B2A2-59B8-4745-9561-49A9AC52E211}" type="presOf" srcId="{E4233A6D-7415-438D-8FDD-390A966DAF61}" destId="{AC8DB091-B58F-49E6-9A89-C4137BD364D0}" srcOrd="0" destOrd="0" presId="urn:microsoft.com/office/officeart/2005/8/layout/hierarchy6"/>
-    <dgm:cxn modelId="{BDB714D0-302E-4D8E-A146-143209CB7EB9}" type="presOf" srcId="{2A0496EF-31A8-4FB8-8A7F-A2CBF8606691}" destId="{7E20B0C3-8A2C-4390-90B0-51E9C4628327}" srcOrd="0" destOrd="0" presId="urn:microsoft.com/office/officeart/2005/8/layout/hierarchy6"/>
-    <dgm:cxn modelId="{84AEBEDF-699D-409C-8FDF-39B8F2078832}" type="presOf" srcId="{2F5A44C0-791D-41F6-AE89-A8AF91720298}" destId="{924D7767-3779-4E75-A9D1-B6EF723A406B}" srcOrd="0" destOrd="0" presId="urn:microsoft.com/office/officeart/2005/8/layout/hierarchy6"/>
+    <dgm:cxn modelId="{9CECA818-D527-4FE0-919E-C19006374085}" type="presOf" srcId="{5C4DE19C-A716-4E24-865A-871D15A6106C}" destId="{98778A9B-C700-42DB-8B31-295727FCB770}" srcOrd="0" destOrd="0" presId="urn:microsoft.com/office/officeart/2005/8/layout/hierarchy6"/>
+    <dgm:cxn modelId="{418B5CB2-8F43-48C1-8199-E6DE90661697}" type="presOf" srcId="{34A3A509-B82F-404C-8687-6E3B1937BBEE}" destId="{E68F78C2-FCC0-473C-8802-5A0A0CB2C679}" srcOrd="0" destOrd="0" presId="urn:microsoft.com/office/officeart/2005/8/layout/hierarchy6"/>
+    <dgm:cxn modelId="{7E254444-F2AB-4E1F-B2A0-F03155BFBFF5}" srcId="{2A0496EF-31A8-4FB8-8A7F-A2CBF8606691}" destId="{2F5A44C0-791D-41F6-AE89-A8AF91720298}" srcOrd="0" destOrd="0" parTransId="{1512B27A-390D-4709-8629-FCA8BEDE4660}" sibTransId="{27C39707-0CBF-4DAD-967E-14A0F8212F79}"/>
+    <dgm:cxn modelId="{07075BE4-1887-4775-8F41-989EDCB308BF}" type="presOf" srcId="{30049703-D785-45D5-9086-D41CD69E5E8B}" destId="{D52E9823-1814-4F22-988A-F8D4598EB50D}" srcOrd="0" destOrd="0" presId="urn:microsoft.com/office/officeart/2005/8/layout/hierarchy6"/>
+    <dgm:cxn modelId="{BD788C0F-E087-4B94-A180-E6C511057C18}" type="presOf" srcId="{8B05A671-0DE7-4C81-B7BE-EFEF4D8B285A}" destId="{1956AAFF-10E4-4255-8BD5-2F66FE8CA411}" srcOrd="0" destOrd="0" presId="urn:microsoft.com/office/officeart/2005/8/layout/hierarchy6"/>
     <dgm:cxn modelId="{EB236707-065C-4D1D-B076-86AEC5CEEB91}" srcId="{8B05A671-0DE7-4C81-B7BE-EFEF4D8B285A}" destId="{0F5FC267-C6FA-4018-82E4-6D1E0CF53473}" srcOrd="0" destOrd="0" parTransId="{5F0C85A7-67E4-42A9-A5B9-AB21F3F7D118}" sibTransId="{A7305806-DFE5-445A-9309-3C585AF24235}"/>
-    <dgm:cxn modelId="{6F58FB3E-AA2A-4594-A1AD-4B37C53642A9}" type="presOf" srcId="{9DF1D68F-2B3E-4268-8AFD-0D98C0209666}" destId="{389F7A8F-AE74-4137-84FF-3105FFB8A33B}" srcOrd="0" destOrd="0" presId="urn:microsoft.com/office/officeart/2005/8/layout/hierarchy6"/>
+    <dgm:cxn modelId="{08D78291-1718-4BC8-86C8-91374E503D0A}" type="presOf" srcId="{6F4FF149-A6CE-41B1-AE4F-203882021B4B}" destId="{99882D7B-548B-49ED-8D25-B2C5E6BB0792}" srcOrd="0" destOrd="0" presId="urn:microsoft.com/office/officeart/2005/8/layout/hierarchy6"/>
+    <dgm:cxn modelId="{C6BBB91B-D864-4683-B753-01DB05FA3F69}" type="presOf" srcId="{CE3A7A2B-0120-4596-8CB3-B686980D22EA}" destId="{0EBCFE24-6A1E-417D-87CE-35AF58869832}" srcOrd="0" destOrd="0" presId="urn:microsoft.com/office/officeart/2005/8/layout/hierarchy6"/>
+    <dgm:cxn modelId="{0667E768-73F9-4898-A480-9B6CDA8EA0A1}" type="presOf" srcId="{42ED198D-698B-41D5-96D0-11D7162BABC1}" destId="{F8775318-346A-4AC7-9707-6144772C35D5}" srcOrd="0" destOrd="0" presId="urn:microsoft.com/office/officeart/2005/8/layout/hierarchy6"/>
+    <dgm:cxn modelId="{281E5842-A5EC-45F4-84F1-613FD73DE8AA}" type="presOf" srcId="{F115A2BD-1E7A-4B98-BA46-8A3FF6432199}" destId="{9C7D0A91-8C5C-4FD7-8EB9-A2426F718068}" srcOrd="0" destOrd="0" presId="urn:microsoft.com/office/officeart/2005/8/layout/hierarchy6"/>
+    <dgm:cxn modelId="{118EEE52-5EF9-489B-961A-2CA4C78AC153}" srcId="{2F5A44C0-791D-41F6-AE89-A8AF91720298}" destId="{BB8C4245-B896-463C-9F6D-6089A25906F7}" srcOrd="0" destOrd="0" parTransId="{20707547-4CCB-4CCC-A7B6-76B2B1A97837}" sibTransId="{339F42B9-B5A2-493A-8ACA-FF560690E9EC}"/>
     <dgm:cxn modelId="{02264204-A44F-4440-BCAE-58C7345FA323}" type="presOf" srcId="{A3948582-E41B-4E64-96CC-A7B8352B50FD}" destId="{34A782E1-AFD9-4879-8F28-FD40976DEF5C}" srcOrd="0" destOrd="0" presId="urn:microsoft.com/office/officeart/2005/8/layout/hierarchy6"/>
     <dgm:cxn modelId="{A1698EF7-4B92-45E0-ABD2-C3C9D2496C05}" srcId="{CE3A7A2B-0120-4596-8CB3-B686980D22EA}" destId="{2A0496EF-31A8-4FB8-8A7F-A2CBF8606691}" srcOrd="0" destOrd="0" parTransId="{34A3A509-B82F-404C-8687-6E3B1937BBEE}" sibTransId="{711EDAB4-B415-4A58-84DA-A2ADED836DE6}"/>
+    <dgm:cxn modelId="{7DAA723A-1CE3-49C2-B8CB-FB0D95B0DACC}" type="presOf" srcId="{A28646E1-B33F-4FF4-9877-08DED234ED89}" destId="{8C7EEA08-EF08-4AD9-9C21-35B928AE57CA}" srcOrd="0" destOrd="0" presId="urn:microsoft.com/office/officeart/2005/8/layout/hierarchy6"/>
+    <dgm:cxn modelId="{51B12532-E68A-4486-9A3F-B4FE41BA33A3}" type="presOf" srcId="{1512B27A-390D-4709-8629-FCA8BEDE4660}" destId="{1AA2EE3E-A9B5-4A09-AC15-11E53F7E90D0}" srcOrd="0" destOrd="0" presId="urn:microsoft.com/office/officeart/2005/8/layout/hierarchy6"/>
+    <dgm:cxn modelId="{82EAC98A-5ACA-4CC9-8C3F-9F5CEBB95B64}" srcId="{2F5A44C0-791D-41F6-AE89-A8AF91720298}" destId="{2E1BB674-35BC-45BB-9673-67B940055B31}" srcOrd="3" destOrd="0" parTransId="{F115A2BD-1E7A-4B98-BA46-8A3FF6432199}" sibTransId="{E40EF4B0-13FD-46F0-9F17-93B749C56BB4}"/>
+    <dgm:cxn modelId="{F31620ED-FE40-41B8-9A92-2F0DECEB045F}" srcId="{2F5A44C0-791D-41F6-AE89-A8AF91720298}" destId="{A28646E1-B33F-4FF4-9877-08DED234ED89}" srcOrd="4" destOrd="0" parTransId="{30049703-D785-45D5-9086-D41CD69E5E8B}" sibTransId="{DAFD1E16-BC67-489D-8D3E-B04961C23619}"/>
+    <dgm:cxn modelId="{24B89DA9-AFAD-4CFC-9AFC-4D95741AC436}" type="presOf" srcId="{ED55D2DB-BE73-4F1D-90F6-D0461196D166}" destId="{EB93688B-C590-459D-A823-880B4C0DE7A9}" srcOrd="0" destOrd="0" presId="urn:microsoft.com/office/officeart/2005/8/layout/hierarchy6"/>
+    <dgm:cxn modelId="{F91052DF-FAD6-4169-A99B-BB91E6FE48CD}" srcId="{2F5A44C0-791D-41F6-AE89-A8AF91720298}" destId="{5C4DE19C-A716-4E24-865A-871D15A6106C}" srcOrd="2" destOrd="0" parTransId="{ED55D2DB-BE73-4F1D-90F6-D0461196D166}" sibTransId="{B842B66A-0CB8-48E1-B230-01504D47AD13}"/>
+    <dgm:cxn modelId="{BDB714D0-302E-4D8E-A146-143209CB7EB9}" type="presOf" srcId="{2A0496EF-31A8-4FB8-8A7F-A2CBF8606691}" destId="{7E20B0C3-8A2C-4390-90B0-51E9C4628327}" srcOrd="0" destOrd="0" presId="urn:microsoft.com/office/officeart/2005/8/layout/hierarchy6"/>
+    <dgm:cxn modelId="{EF1D9E71-A555-408C-8B53-311EDD8AFEC0}" srcId="{A28646E1-B33F-4FF4-9877-08DED234ED89}" destId="{C6292CA7-7F2C-457B-824C-FDAD1A300612}" srcOrd="0" destOrd="0" parTransId="{6797477D-2FBC-4C66-B693-B1358AD756A9}" sibTransId="{EA639A36-FBDA-4389-88D6-486CC80E92FD}"/>
+    <dgm:cxn modelId="{9FC108E5-589B-4D33-BE4E-9E562824F9AC}" srcId="{A3948582-E41B-4E64-96CC-A7B8352B50FD}" destId="{CE3A7A2B-0120-4596-8CB3-B686980D22EA}" srcOrd="0" destOrd="0" parTransId="{325C2410-EEE4-475F-8DC3-556367C17848}" sibTransId="{DCCB8526-D7E7-41F0-B75B-247A63F7E4F2}"/>
+    <dgm:cxn modelId="{6A982B11-3CCE-4A26-A4C6-8D35256F7E10}" type="presOf" srcId="{6797477D-2FBC-4C66-B693-B1358AD756A9}" destId="{E5CAF7CA-E25C-4C1C-B864-8B33F7D31AAE}" srcOrd="0" destOrd="0" presId="urn:microsoft.com/office/officeart/2005/8/layout/hierarchy6"/>
+    <dgm:cxn modelId="{84AEBEDF-699D-409C-8FDF-39B8F2078832}" type="presOf" srcId="{2F5A44C0-791D-41F6-AE89-A8AF91720298}" destId="{924D7767-3779-4E75-A9D1-B6EF723A406B}" srcOrd="0" destOrd="0" presId="urn:microsoft.com/office/officeart/2005/8/layout/hierarchy6"/>
+    <dgm:cxn modelId="{34FED145-F186-405B-B467-025CCF264B4C}" srcId="{5C4DE19C-A716-4E24-865A-871D15A6106C}" destId="{63376BF1-6687-43EE-ADA3-D36BAEFB7DEE}" srcOrd="0" destOrd="0" parTransId="{E4233A6D-7415-438D-8FDD-390A966DAF61}" sibTransId="{DEA88744-D54F-46A0-AC82-2F6C542D45AE}"/>
+    <dgm:cxn modelId="{6F58FB3E-AA2A-4594-A1AD-4B37C53642A9}" type="presOf" srcId="{9DF1D68F-2B3E-4268-8AFD-0D98C0209666}" destId="{389F7A8F-AE74-4137-84FF-3105FFB8A33B}" srcOrd="0" destOrd="0" presId="urn:microsoft.com/office/officeart/2005/8/layout/hierarchy6"/>
+    <dgm:cxn modelId="{2A455528-482E-4825-98EB-67F715F8E105}" type="presOf" srcId="{63376BF1-6687-43EE-ADA3-D36BAEFB7DEE}" destId="{B288F2FA-C717-48A3-A9F5-9FC1E4AF394C}" srcOrd="0" destOrd="0" presId="urn:microsoft.com/office/officeart/2005/8/layout/hierarchy6"/>
+    <dgm:cxn modelId="{C58A26B1-320E-40AF-910A-81FF791114BD}" type="presOf" srcId="{20707547-4CCB-4CCC-A7B6-76B2B1A97837}" destId="{D963691C-3642-4A13-9D4B-615A02507769}" srcOrd="0" destOrd="0" presId="urn:microsoft.com/office/officeart/2005/8/layout/hierarchy6"/>
+    <dgm:cxn modelId="{D1ADB1EA-4BB3-49A6-AD72-DC1CB8428524}" srcId="{2E1BB674-35BC-45BB-9673-67B940055B31}" destId="{1B41352A-2EA7-4FF6-9968-BC030163D094}" srcOrd="0" destOrd="0" parTransId="{42ED198D-698B-41D5-96D0-11D7162BABC1}" sibTransId="{5A46E43D-4ADE-4B51-BA3E-17CBEA03D9A7}"/>
+    <dgm:cxn modelId="{947130EA-0F23-4FE5-9267-E0D2A9DB1EB6}" srcId="{BB8C4245-B896-463C-9F6D-6089A25906F7}" destId="{6F4FF149-A6CE-41B1-AE4F-203882021B4B}" srcOrd="0" destOrd="0" parTransId="{9DF1D68F-2B3E-4268-8AFD-0D98C0209666}" sibTransId="{661E8DE5-3519-455B-9799-EE1CAB41BCAF}"/>
+    <dgm:cxn modelId="{0D0FBA14-6749-470B-A6B1-11AF98DD40A2}" type="presOf" srcId="{C6292CA7-7F2C-457B-824C-FDAD1A300612}" destId="{2122F150-D109-449A-8204-7E319E4F5DAA}" srcOrd="0" destOrd="0" presId="urn:microsoft.com/office/officeart/2005/8/layout/hierarchy6"/>
+    <dgm:cxn modelId="{C4F33C3F-965D-4E83-8D38-1174A8666C11}" type="presOf" srcId="{BB8C4245-B896-463C-9F6D-6089A25906F7}" destId="{9310C464-F17A-4EE5-9628-6BEBE30D390D}" srcOrd="0" destOrd="0" presId="urn:microsoft.com/office/officeart/2005/8/layout/hierarchy6"/>
+    <dgm:cxn modelId="{DFA0B2A2-59B8-4745-9561-49A9AC52E211}" type="presOf" srcId="{E4233A6D-7415-438D-8FDD-390A966DAF61}" destId="{AC8DB091-B58F-49E6-9A89-C4137BD364D0}" srcOrd="0" destOrd="0" presId="urn:microsoft.com/office/officeart/2005/8/layout/hierarchy6"/>
+    <dgm:cxn modelId="{466EAACD-FEB0-407D-98EB-C67C4904C4D9}" srcId="{2F5A44C0-791D-41F6-AE89-A8AF91720298}" destId="{8B05A671-0DE7-4C81-B7BE-EFEF4D8B285A}" srcOrd="1" destOrd="0" parTransId="{02CFAFD5-A585-4FF0-AD27-9E6537265522}" sibTransId="{EB08C90F-DB27-43A1-986B-3F70646A2D51}"/>
+    <dgm:cxn modelId="{DD6ED853-DFB6-4D4E-AAFF-9BA2955F65B3}" type="presOf" srcId="{0F5FC267-C6FA-4018-82E4-6D1E0CF53473}" destId="{31B4494D-E553-4E42-BC59-010A49910B4D}" srcOrd="0" destOrd="0" presId="urn:microsoft.com/office/officeart/2005/8/layout/hierarchy6"/>
+    <dgm:cxn modelId="{F070D942-9F3D-4F57-9CFE-BFC88E7801DA}" type="presOf" srcId="{1B41352A-2EA7-4FF6-9968-BC030163D094}" destId="{B62A4414-83F8-46D3-8330-4FC9C5171295}" srcOrd="0" destOrd="0" presId="urn:microsoft.com/office/officeart/2005/8/layout/hierarchy6"/>
+    <dgm:cxn modelId="{442D9682-DD1F-48FB-B407-434E123177AC}" type="presOf" srcId="{02CFAFD5-A585-4FF0-AD27-9E6537265522}" destId="{A3A32269-1CAF-4DC2-B4D7-72FD83E37B5B}" srcOrd="0" destOrd="0" presId="urn:microsoft.com/office/officeart/2005/8/layout/hierarchy6"/>
     <dgm:cxn modelId="{B5855E00-4E6E-4E7C-84C8-9CC496C04A8D}" type="presOf" srcId="{2E1BB674-35BC-45BB-9673-67B940055B31}" destId="{05786130-55A6-41D7-9FFE-9F45D3899688}" srcOrd="0" destOrd="0" presId="urn:microsoft.com/office/officeart/2005/8/layout/hierarchy6"/>
-    <dgm:cxn modelId="{9CECA818-D527-4FE0-919E-C19006374085}" type="presOf" srcId="{5C4DE19C-A716-4E24-865A-871D15A6106C}" destId="{98778A9B-C700-42DB-8B31-295727FCB770}" srcOrd="0" destOrd="0" presId="urn:microsoft.com/office/officeart/2005/8/layout/hierarchy6"/>
-    <dgm:cxn modelId="{442D9682-DD1F-48FB-B407-434E123177AC}" type="presOf" srcId="{02CFAFD5-A585-4FF0-AD27-9E6537265522}" destId="{A3A32269-1CAF-4DC2-B4D7-72FD83E37B5B}" srcOrd="0" destOrd="0" presId="urn:microsoft.com/office/officeart/2005/8/layout/hierarchy6"/>
-    <dgm:cxn modelId="{281E5842-A5EC-45F4-84F1-613FD73DE8AA}" type="presOf" srcId="{F115A2BD-1E7A-4B98-BA46-8A3FF6432199}" destId="{9C7D0A91-8C5C-4FD7-8EB9-A2426F718068}" srcOrd="0" destOrd="0" presId="urn:microsoft.com/office/officeart/2005/8/layout/hierarchy6"/>
-    <dgm:cxn modelId="{0D0FBA14-6749-470B-A6B1-11AF98DD40A2}" type="presOf" srcId="{C6292CA7-7F2C-457B-824C-FDAD1A300612}" destId="{2122F150-D109-449A-8204-7E319E4F5DAA}" srcOrd="0" destOrd="0" presId="urn:microsoft.com/office/officeart/2005/8/layout/hierarchy6"/>
-    <dgm:cxn modelId="{118EEE52-5EF9-489B-961A-2CA4C78AC153}" srcId="{2F5A44C0-791D-41F6-AE89-A8AF91720298}" destId="{BB8C4245-B896-463C-9F6D-6089A25906F7}" srcOrd="0" destOrd="0" parTransId="{20707547-4CCB-4CCC-A7B6-76B2B1A97837}" sibTransId="{339F42B9-B5A2-493A-8ACA-FF560690E9EC}"/>
-    <dgm:cxn modelId="{7E254444-F2AB-4E1F-B2A0-F03155BFBFF5}" srcId="{2A0496EF-31A8-4FB8-8A7F-A2CBF8606691}" destId="{2F5A44C0-791D-41F6-AE89-A8AF91720298}" srcOrd="0" destOrd="0" parTransId="{1512B27A-390D-4709-8629-FCA8BEDE4660}" sibTransId="{27C39707-0CBF-4DAD-967E-14A0F8212F79}"/>
-    <dgm:cxn modelId="{F91052DF-FAD6-4169-A99B-BB91E6FE48CD}" srcId="{2F5A44C0-791D-41F6-AE89-A8AF91720298}" destId="{5C4DE19C-A716-4E24-865A-871D15A6106C}" srcOrd="2" destOrd="0" parTransId="{ED55D2DB-BE73-4F1D-90F6-D0461196D166}" sibTransId="{B842B66A-0CB8-48E1-B230-01504D47AD13}"/>
-    <dgm:cxn modelId="{7DAA723A-1CE3-49C2-B8CB-FB0D95B0DACC}" type="presOf" srcId="{A28646E1-B33F-4FF4-9877-08DED234ED89}" destId="{8C7EEA08-EF08-4AD9-9C21-35B928AE57CA}" srcOrd="0" destOrd="0" presId="urn:microsoft.com/office/officeart/2005/8/layout/hierarchy6"/>
-    <dgm:cxn modelId="{DD6ED853-DFB6-4D4E-AAFF-9BA2955F65B3}" type="presOf" srcId="{0F5FC267-C6FA-4018-82E4-6D1E0CF53473}" destId="{31B4494D-E553-4E42-BC59-010A49910B4D}" srcOrd="0" destOrd="0" presId="urn:microsoft.com/office/officeart/2005/8/layout/hierarchy6"/>
-    <dgm:cxn modelId="{418B5CB2-8F43-48C1-8199-E6DE90661697}" type="presOf" srcId="{34A3A509-B82F-404C-8687-6E3B1937BBEE}" destId="{E68F78C2-FCC0-473C-8802-5A0A0CB2C679}" srcOrd="0" destOrd="0" presId="urn:microsoft.com/office/officeart/2005/8/layout/hierarchy6"/>
-    <dgm:cxn modelId="{C4F33C3F-965D-4E83-8D38-1174A8666C11}" type="presOf" srcId="{BB8C4245-B896-463C-9F6D-6089A25906F7}" destId="{9310C464-F17A-4EE5-9628-6BEBE30D390D}" srcOrd="0" destOrd="0" presId="urn:microsoft.com/office/officeart/2005/8/layout/hierarchy6"/>
-    <dgm:cxn modelId="{C58A26B1-320E-40AF-910A-81FF791114BD}" type="presOf" srcId="{20707547-4CCB-4CCC-A7B6-76B2B1A97837}" destId="{D963691C-3642-4A13-9D4B-615A02507769}" srcOrd="0" destOrd="0" presId="urn:microsoft.com/office/officeart/2005/8/layout/hierarchy6"/>
-    <dgm:cxn modelId="{C6BBB91B-D864-4683-B753-01DB05FA3F69}" type="presOf" srcId="{CE3A7A2B-0120-4596-8CB3-B686980D22EA}" destId="{0EBCFE24-6A1E-417D-87CE-35AF58869832}" srcOrd="0" destOrd="0" presId="urn:microsoft.com/office/officeart/2005/8/layout/hierarchy6"/>
-    <dgm:cxn modelId="{07075BE4-1887-4775-8F41-989EDCB308BF}" type="presOf" srcId="{30049703-D785-45D5-9086-D41CD69E5E8B}" destId="{D52E9823-1814-4F22-988A-F8D4598EB50D}" srcOrd="0" destOrd="0" presId="urn:microsoft.com/office/officeart/2005/8/layout/hierarchy6"/>
-    <dgm:cxn modelId="{51B12532-E68A-4486-9A3F-B4FE41BA33A3}" type="presOf" srcId="{1512B27A-390D-4709-8629-FCA8BEDE4660}" destId="{1AA2EE3E-A9B5-4A09-AC15-11E53F7E90D0}" srcOrd="0" destOrd="0" presId="urn:microsoft.com/office/officeart/2005/8/layout/hierarchy6"/>
-    <dgm:cxn modelId="{EF1D9E71-A555-408C-8B53-311EDD8AFEC0}" srcId="{A28646E1-B33F-4FF4-9877-08DED234ED89}" destId="{C6292CA7-7F2C-457B-824C-FDAD1A300612}" srcOrd="0" destOrd="0" parTransId="{6797477D-2FBC-4C66-B693-B1358AD756A9}" sibTransId="{EA639A36-FBDA-4389-88D6-486CC80E92FD}"/>
-    <dgm:cxn modelId="{F31620ED-FE40-41B8-9A92-2F0DECEB045F}" srcId="{2F5A44C0-791D-41F6-AE89-A8AF91720298}" destId="{A28646E1-B33F-4FF4-9877-08DED234ED89}" srcOrd="4" destOrd="0" parTransId="{30049703-D785-45D5-9086-D41CD69E5E8B}" sibTransId="{DAFD1E16-BC67-489D-8D3E-B04961C23619}"/>
-    <dgm:cxn modelId="{08D78291-1718-4BC8-86C8-91374E503D0A}" type="presOf" srcId="{6F4FF149-A6CE-41B1-AE4F-203882021B4B}" destId="{99882D7B-548B-49ED-8D25-B2C5E6BB0792}" srcOrd="0" destOrd="0" presId="urn:microsoft.com/office/officeart/2005/8/layout/hierarchy6"/>
-    <dgm:cxn modelId="{0667E768-73F9-4898-A480-9B6CDA8EA0A1}" type="presOf" srcId="{42ED198D-698B-41D5-96D0-11D7162BABC1}" destId="{F8775318-346A-4AC7-9707-6144772C35D5}" srcOrd="0" destOrd="0" presId="urn:microsoft.com/office/officeart/2005/8/layout/hierarchy6"/>
-    <dgm:cxn modelId="{34FED145-F186-405B-B467-025CCF264B4C}" srcId="{5C4DE19C-A716-4E24-865A-871D15A6106C}" destId="{63376BF1-6687-43EE-ADA3-D36BAEFB7DEE}" srcOrd="0" destOrd="0" parTransId="{E4233A6D-7415-438D-8FDD-390A966DAF61}" sibTransId="{DEA88744-D54F-46A0-AC82-2F6C542D45AE}"/>
-    <dgm:cxn modelId="{BD788C0F-E087-4B94-A180-E6C511057C18}" type="presOf" srcId="{8B05A671-0DE7-4C81-B7BE-EFEF4D8B285A}" destId="{1956AAFF-10E4-4255-8BD5-2F66FE8CA411}" srcOrd="0" destOrd="0" presId="urn:microsoft.com/office/officeart/2005/8/layout/hierarchy6"/>
     <dgm:cxn modelId="{630F4EFE-B45A-4F04-A344-E066CF88173B}" type="presOf" srcId="{5F0C85A7-67E4-42A9-A5B9-AB21F3F7D118}" destId="{5150048F-8CE1-41E9-87EB-F85F39971A52}" srcOrd="0" destOrd="0" presId="urn:microsoft.com/office/officeart/2005/8/layout/hierarchy6"/>
-    <dgm:cxn modelId="{9FC108E5-589B-4D33-BE4E-9E562824F9AC}" srcId="{A3948582-E41B-4E64-96CC-A7B8352B50FD}" destId="{CE3A7A2B-0120-4596-8CB3-B686980D22EA}" srcOrd="0" destOrd="0" parTransId="{325C2410-EEE4-475F-8DC3-556367C17848}" sibTransId="{DCCB8526-D7E7-41F0-B75B-247A63F7E4F2}"/>
-    <dgm:cxn modelId="{82EAC98A-5ACA-4CC9-8C3F-9F5CEBB95B64}" srcId="{2F5A44C0-791D-41F6-AE89-A8AF91720298}" destId="{2E1BB674-35BC-45BB-9673-67B940055B31}" srcOrd="3" destOrd="0" parTransId="{F115A2BD-1E7A-4B98-BA46-8A3FF6432199}" sibTransId="{E40EF4B0-13FD-46F0-9F17-93B749C56BB4}"/>
-    <dgm:cxn modelId="{D1ADB1EA-4BB3-49A6-AD72-DC1CB8428524}" srcId="{2E1BB674-35BC-45BB-9673-67B940055B31}" destId="{1B41352A-2EA7-4FF6-9968-BC030163D094}" srcOrd="0" destOrd="0" parTransId="{42ED198D-698B-41D5-96D0-11D7162BABC1}" sibTransId="{5A46E43D-4ADE-4B51-BA3E-17CBEA03D9A7}"/>
-    <dgm:cxn modelId="{24B89DA9-AFAD-4CFC-9AFC-4D95741AC436}" type="presOf" srcId="{ED55D2DB-BE73-4F1D-90F6-D0461196D166}" destId="{EB93688B-C590-459D-A823-880B4C0DE7A9}" srcOrd="0" destOrd="0" presId="urn:microsoft.com/office/officeart/2005/8/layout/hierarchy6"/>
-    <dgm:cxn modelId="{466EAACD-FEB0-407D-98EB-C67C4904C4D9}" srcId="{2F5A44C0-791D-41F6-AE89-A8AF91720298}" destId="{8B05A671-0DE7-4C81-B7BE-EFEF4D8B285A}" srcOrd="1" destOrd="0" parTransId="{02CFAFD5-A585-4FF0-AD27-9E6537265522}" sibTransId="{EB08C90F-DB27-43A1-986B-3F70646A2D51}"/>
-    <dgm:cxn modelId="{F070D942-9F3D-4F57-9CFE-BFC88E7801DA}" type="presOf" srcId="{1B41352A-2EA7-4FF6-9968-BC030163D094}" destId="{B62A4414-83F8-46D3-8330-4FC9C5171295}" srcOrd="0" destOrd="0" presId="urn:microsoft.com/office/officeart/2005/8/layout/hierarchy6"/>
-    <dgm:cxn modelId="{947130EA-0F23-4FE5-9267-E0D2A9DB1EB6}" srcId="{BB8C4245-B896-463C-9F6D-6089A25906F7}" destId="{6F4FF149-A6CE-41B1-AE4F-203882021B4B}" srcOrd="0" destOrd="0" parTransId="{9DF1D68F-2B3E-4268-8AFD-0D98C0209666}" sibTransId="{661E8DE5-3519-455B-9799-EE1CAB41BCAF}"/>
-    <dgm:cxn modelId="{6A982B11-3CCE-4A26-A4C6-8D35256F7E10}" type="presOf" srcId="{6797477D-2FBC-4C66-B693-B1358AD756A9}" destId="{E5CAF7CA-E25C-4C1C-B864-8B33F7D31AAE}" srcOrd="0" destOrd="0" presId="urn:microsoft.com/office/officeart/2005/8/layout/hierarchy6"/>
-    <dgm:cxn modelId="{2A455528-482E-4825-98EB-67F715F8E105}" type="presOf" srcId="{63376BF1-6687-43EE-ADA3-D36BAEFB7DEE}" destId="{B288F2FA-C717-48A3-A9F5-9FC1E4AF394C}" srcOrd="0" destOrd="0" presId="urn:microsoft.com/office/officeart/2005/8/layout/hierarchy6"/>
     <dgm:cxn modelId="{B157827E-F4AF-41C0-ACCC-3E51FC913D1A}" type="presParOf" srcId="{34A782E1-AFD9-4879-8F28-FD40976DEF5C}" destId="{23DD04AF-9014-4775-8943-662D040C6072}" srcOrd="0" destOrd="0" presId="urn:microsoft.com/office/officeart/2005/8/layout/hierarchy6"/>
     <dgm:cxn modelId="{CBD25336-E641-4ED6-B5EC-0330BE95EF49}" type="presParOf" srcId="{23DD04AF-9014-4775-8943-662D040C6072}" destId="{2DDC3670-F275-47DC-83E2-1F7471C2ACC3}" srcOrd="0" destOrd="0" presId="urn:microsoft.com/office/officeart/2005/8/layout/hierarchy6"/>
     <dgm:cxn modelId="{62DF30C1-3676-4D78-9E5C-93EA7567C6AA}" type="presParOf" srcId="{2DDC3670-F275-47DC-83E2-1F7471C2ACC3}" destId="{6710931F-E719-46E6-A357-D18D0D5670D3}" srcOrd="0" destOrd="0" presId="urn:microsoft.com/office/officeart/2005/8/layout/hierarchy6"/>
@@ -4051,11 +4051,7 @@
           </a:pPr>
           <a:r>
             <a:rPr lang="ro-RO" sz="2400" kern="1200" dirty="0" smtClean="0"/>
-            <a:t>Aplicație </a:t>
-          </a:r>
-          <a:r>
-            <a:rPr lang="ro-RO" sz="2400" kern="1200" dirty="0" smtClean="0"/>
-            <a:t>Server</a:t>
+            <a:t>Aplicație Server</a:t>
           </a:r>
           <a:endParaRPr lang="en-US" sz="2400" kern="1200" dirty="0"/>
         </a:p>
@@ -5349,7 +5345,11 @@
           </a:pPr>
           <a:r>
             <a:rPr lang="ro-RO" sz="2100" kern="1200" dirty="0" smtClean="0"/>
-            <a:t>Încuietoare usă</a:t>
+            <a:t>Încuietoare </a:t>
+          </a:r>
+          <a:r>
+            <a:rPr lang="ro-RO" sz="2100" kern="1200" dirty="0" smtClean="0"/>
+            <a:t>ușă</a:t>
           </a:r>
           <a:endParaRPr lang="en-US" sz="2100" kern="1200" dirty="0"/>
         </a:p>
@@ -8875,7 +8875,7 @@
           <a:p>
             <a:fld id="{AD4712C2-029A-4884-AB9A-6281E8C47259}" type="datetimeFigureOut">
               <a:rPr lang="en-US" smtClean="0"/>
-              <a:t>14-Jun-18</a:t>
+              <a:t>19-Jun-18</a:t>
             </a:fld>
             <a:endParaRPr lang="en-US"/>
           </a:p>
@@ -9045,7 +9045,7 @@
           <a:p>
             <a:fld id="{AD4712C2-029A-4884-AB9A-6281E8C47259}" type="datetimeFigureOut">
               <a:rPr lang="en-US" smtClean="0"/>
-              <a:t>14-Jun-18</a:t>
+              <a:t>19-Jun-18</a:t>
             </a:fld>
             <a:endParaRPr lang="en-US"/>
           </a:p>
@@ -9225,7 +9225,7 @@
           <a:p>
             <a:fld id="{AD4712C2-029A-4884-AB9A-6281E8C47259}" type="datetimeFigureOut">
               <a:rPr lang="en-US" smtClean="0"/>
-              <a:t>14-Jun-18</a:t>
+              <a:t>19-Jun-18</a:t>
             </a:fld>
             <a:endParaRPr lang="en-US"/>
           </a:p>
@@ -9395,7 +9395,7 @@
           <a:p>
             <a:fld id="{AD4712C2-029A-4884-AB9A-6281E8C47259}" type="datetimeFigureOut">
               <a:rPr lang="en-US" smtClean="0"/>
-              <a:t>14-Jun-18</a:t>
+              <a:t>19-Jun-18</a:t>
             </a:fld>
             <a:endParaRPr lang="en-US"/>
           </a:p>
@@ -9641,7 +9641,7 @@
           <a:p>
             <a:fld id="{AD4712C2-029A-4884-AB9A-6281E8C47259}" type="datetimeFigureOut">
               <a:rPr lang="en-US" smtClean="0"/>
-              <a:t>14-Jun-18</a:t>
+              <a:t>19-Jun-18</a:t>
             </a:fld>
             <a:endParaRPr lang="en-US"/>
           </a:p>
@@ -9873,7 +9873,7 @@
           <a:p>
             <a:fld id="{AD4712C2-029A-4884-AB9A-6281E8C47259}" type="datetimeFigureOut">
               <a:rPr lang="en-US" smtClean="0"/>
-              <a:t>14-Jun-18</a:t>
+              <a:t>19-Jun-18</a:t>
             </a:fld>
             <a:endParaRPr lang="en-US"/>
           </a:p>
@@ -10240,7 +10240,7 @@
           <a:p>
             <a:fld id="{AD4712C2-029A-4884-AB9A-6281E8C47259}" type="datetimeFigureOut">
               <a:rPr lang="en-US" smtClean="0"/>
-              <a:t>14-Jun-18</a:t>
+              <a:t>19-Jun-18</a:t>
             </a:fld>
             <a:endParaRPr lang="en-US"/>
           </a:p>
@@ -10358,7 +10358,7 @@
           <a:p>
             <a:fld id="{AD4712C2-029A-4884-AB9A-6281E8C47259}" type="datetimeFigureOut">
               <a:rPr lang="en-US" smtClean="0"/>
-              <a:t>14-Jun-18</a:t>
+              <a:t>19-Jun-18</a:t>
             </a:fld>
             <a:endParaRPr lang="en-US"/>
           </a:p>
@@ -10453,7 +10453,7 @@
           <a:p>
             <a:fld id="{AD4712C2-029A-4884-AB9A-6281E8C47259}" type="datetimeFigureOut">
               <a:rPr lang="en-US" smtClean="0"/>
-              <a:t>14-Jun-18</a:t>
+              <a:t>19-Jun-18</a:t>
             </a:fld>
             <a:endParaRPr lang="en-US"/>
           </a:p>
@@ -10730,7 +10730,7 @@
           <a:p>
             <a:fld id="{AD4712C2-029A-4884-AB9A-6281E8C47259}" type="datetimeFigureOut">
               <a:rPr lang="en-US" smtClean="0"/>
-              <a:t>14-Jun-18</a:t>
+              <a:t>19-Jun-18</a:t>
             </a:fld>
             <a:endParaRPr lang="en-US"/>
           </a:p>
@@ -10983,7 +10983,7 @@
           <a:p>
             <a:fld id="{AD4712C2-029A-4884-AB9A-6281E8C47259}" type="datetimeFigureOut">
               <a:rPr lang="en-US" smtClean="0"/>
-              <a:t>14-Jun-18</a:t>
+              <a:t>19-Jun-18</a:t>
             </a:fld>
             <a:endParaRPr lang="en-US"/>
           </a:p>
@@ -11196,7 +11196,7 @@
           <a:p>
             <a:fld id="{AD4712C2-029A-4884-AB9A-6281E8C47259}" type="datetimeFigureOut">
               <a:rPr lang="en-US" smtClean="0"/>
-              <a:t>14-Jun-18</a:t>
+              <a:t>19-Jun-18</a:t>
             </a:fld>
             <a:endParaRPr lang="en-US"/>
           </a:p>
@@ -11721,8 +11721,8 @@
         </p:nvSpPr>
         <p:spPr>
           <a:xfrm>
-            <a:off x="6053134" y="886368"/>
-            <a:ext cx="5681666" cy="893107"/>
+            <a:off x="6053134" y="193010"/>
+            <a:ext cx="6016946" cy="1338850"/>
           </a:xfrm>
           <a:prstGeom prst="cloudCallout">
             <a:avLst>
@@ -11753,83 +11753,102 @@
               <a:buAutoNum type="arabicPeriod"/>
             </a:pPr>
             <a:r>
-              <a:rPr lang="ro-RO" sz="1200" dirty="0" smtClean="0"/>
+              <a:rPr lang="ro-RO" sz="1400" dirty="0" smtClean="0"/>
               <a:t>Conectare la</a:t>
             </a:r>
             <a:r>
-              <a:rPr lang="en-US" sz="1200" dirty="0" smtClean="0"/>
+              <a:rPr lang="en-US" sz="1400" dirty="0" smtClean="0"/>
               <a:t> </a:t>
             </a:r>
             <a:r>
-              <a:rPr lang="ro-RO" sz="1200" dirty="0"/>
+              <a:rPr lang="ro-RO" sz="1400" dirty="0"/>
               <a:t>s</a:t>
             </a:r>
             <a:r>
-              <a:rPr lang="en-US" sz="1200" dirty="0" err="1" smtClean="0"/>
+              <a:rPr lang="en-US" sz="1400" dirty="0" err="1" smtClean="0"/>
               <a:t>erver</a:t>
             </a:r>
             <a:r>
-              <a:rPr lang="en-US" sz="1200" dirty="0" smtClean="0"/>
+              <a:rPr lang="ro-RO" sz="1400" dirty="0" smtClean="0"/>
+              <a:t> </a:t>
+            </a:r>
+            <a:r>
+              <a:rPr lang="en-US" sz="1400" dirty="0" smtClean="0"/>
               <a:t>(</a:t>
             </a:r>
             <a:r>
-              <a:rPr lang="ro-RO" sz="1200" dirty="0" smtClean="0"/>
+              <a:rPr lang="ro-RO" sz="1400" dirty="0" smtClean="0"/>
               <a:t>email </a:t>
             </a:r>
             <a:r>
-              <a:rPr lang="en-US" sz="1200" dirty="0" smtClean="0"/>
+              <a:rPr lang="en-US" sz="1400" dirty="0" smtClean="0"/>
               <a:t>+ </a:t>
             </a:r>
             <a:r>
-              <a:rPr lang="ro-RO" sz="1200" dirty="0" smtClean="0"/>
+              <a:rPr lang="ro-RO" sz="1400" dirty="0" smtClean="0"/>
               <a:t>parolă</a:t>
             </a:r>
             <a:r>
-              <a:rPr lang="en-US" sz="1200" dirty="0" smtClean="0"/>
+              <a:rPr lang="en-US" sz="1400" dirty="0" smtClean="0"/>
               <a:t>)</a:t>
             </a:r>
+            <a:r>
+              <a:rPr lang="ro-RO" sz="1400" dirty="0" smtClean="0"/>
+              <a:t>;</a:t>
+            </a:r>
+            <a:endParaRPr lang="en-US" sz="1400" dirty="0" smtClean="0"/>
           </a:p>
           <a:p>
             <a:pPr marL="228600" indent="-228600">
               <a:buAutoNum type="arabicPeriod"/>
             </a:pPr>
             <a:r>
-              <a:rPr lang="ro-RO" sz="1200" dirty="0" smtClean="0"/>
-              <a:t>Managementul dispozitivelor</a:t>
+              <a:rPr lang="ro-RO" sz="1400" dirty="0" smtClean="0"/>
+              <a:t>Managementul </a:t>
             </a:r>
             <a:r>
-              <a:rPr lang="en-US" sz="1200" dirty="0" smtClean="0"/>
-              <a:t> </a:t>
+              <a:rPr lang="ro-RO" sz="1400" dirty="0" smtClean="0"/>
+              <a:t>dispozitivelor</a:t>
             </a:r>
+            <a:r>
+              <a:rPr lang="ro-RO" sz="1400" dirty="0" smtClean="0"/>
+              <a:t>;</a:t>
+            </a:r>
+            <a:endParaRPr lang="en-US" sz="1400" dirty="0" smtClean="0"/>
           </a:p>
           <a:p>
             <a:pPr marL="228600" indent="-228600">
               <a:buAutoNum type="arabicPeriod"/>
             </a:pPr>
             <a:r>
-              <a:rPr lang="ro-RO" sz="1200" dirty="0" smtClean="0"/>
+              <a:rPr lang="ro-RO" sz="1400" dirty="0" smtClean="0"/>
               <a:t>Control asupra dispozitivelor personale</a:t>
             </a:r>
             <a:r>
-              <a:rPr lang="en-US" sz="1200" dirty="0" smtClean="0"/>
+              <a:rPr lang="en-US" sz="1400" dirty="0" smtClean="0"/>
               <a:t>(</a:t>
             </a:r>
             <a:r>
-              <a:rPr lang="ro-RO" sz="1200" dirty="0" smtClean="0"/>
+              <a:rPr lang="ro-RO" sz="1400" dirty="0" smtClean="0"/>
               <a:t>cerere</a:t>
             </a:r>
             <a:r>
-              <a:rPr lang="en-US" sz="1200" dirty="0" smtClean="0"/>
+              <a:rPr lang="en-US" sz="1400" dirty="0" smtClean="0"/>
               <a:t> - </a:t>
             </a:r>
             <a:r>
-              <a:rPr lang="ro-RO" sz="1200" dirty="0" smtClean="0"/>
+              <a:rPr lang="ro-RO" sz="1400" dirty="0" smtClean="0"/>
               <a:t>răspuns</a:t>
             </a:r>
             <a:r>
-              <a:rPr lang="en-US" sz="1200" dirty="0" smtClean="0"/>
+              <a:rPr lang="en-US" sz="1400" dirty="0" smtClean="0"/>
               <a:t>)</a:t>
             </a:r>
+            <a:r>
+              <a:rPr lang="ro-RO" sz="1400" dirty="0" smtClean="0"/>
+              <a:t>.</a:t>
+            </a:r>
+            <a:endParaRPr lang="en-US" sz="1400" dirty="0" smtClean="0"/>
           </a:p>
         </p:txBody>
       </p:sp>
@@ -11841,8 +11860,8 @@
         </p:nvSpPr>
         <p:spPr>
           <a:xfrm>
-            <a:off x="6184920" y="2203101"/>
-            <a:ext cx="5549880" cy="1306287"/>
+            <a:off x="6089903" y="1677452"/>
+            <a:ext cx="5980178" cy="1742403"/>
           </a:xfrm>
           <a:prstGeom prst="cloudCallout">
             <a:avLst>
@@ -11872,97 +11891,101 @@
             <a:pPr marL="228600" indent="-228600">
               <a:buAutoNum type="arabicPeriod"/>
             </a:pPr>
-            <a:endParaRPr lang="en-US" sz="1200" dirty="0" smtClean="0"/>
-          </a:p>
-          <a:p>
-            <a:pPr marL="228600" indent="-228600">
-              <a:buAutoNum type="arabicPeriod"/>
-            </a:pPr>
-            <a:endParaRPr lang="en-US" sz="1200" dirty="0"/>
+            <a:endParaRPr lang="en-US" sz="1400" dirty="0" smtClean="0"/>
           </a:p>
           <a:p>
             <a:pPr marL="228600" indent="-228600">
               <a:buAutoNum type="arabicPeriod"/>
             </a:pPr>
             <a:r>
-              <a:rPr lang="ro-RO" sz="1200" dirty="0" smtClean="0"/>
-              <a:t>Autentifică utilizatorii</a:t>
+              <a:rPr lang="ro-RO" sz="1400" dirty="0" smtClean="0"/>
+              <a:t>Autentifică utilizatorii;</a:t>
             </a:r>
-            <a:endParaRPr lang="en-US" sz="1200" dirty="0" smtClean="0"/>
+            <a:endParaRPr lang="en-US" sz="1400" dirty="0" smtClean="0"/>
           </a:p>
           <a:p>
             <a:pPr marL="228600" indent="-228600">
               <a:buAutoNum type="arabicPeriod"/>
             </a:pPr>
             <a:r>
-              <a:rPr lang="ro-RO" sz="1200" dirty="0" smtClean="0"/>
-              <a:t>Bază de date cu utilizatori, dispositive</a:t>
+              <a:rPr lang="ro-RO" sz="1400" dirty="0" smtClean="0"/>
+              <a:t>Bază de date cu utilizatori, </a:t>
             </a:r>
             <a:r>
-              <a:rPr lang="en-US" sz="1200" dirty="0" smtClean="0"/>
+              <a:rPr lang="ro-RO" sz="1400" dirty="0" smtClean="0"/>
+              <a:t>dispozitive</a:t>
+            </a:r>
+            <a:r>
+              <a:rPr lang="en-US" sz="1400" dirty="0" smtClean="0"/>
               <a:t>; </a:t>
             </a:r>
             <a:r>
-              <a:rPr lang="ro-RO" sz="1200" dirty="0" smtClean="0"/>
-              <a:t>stocare persistentă a datelor</a:t>
+              <a:rPr lang="ro-RO" sz="1400" dirty="0" smtClean="0"/>
+              <a:t>stocare persistentă a </a:t>
             </a:r>
-            <a:endParaRPr lang="en-US" sz="1200" dirty="0" smtClean="0"/>
+            <a:r>
+              <a:rPr lang="ro-RO" sz="1400" dirty="0" smtClean="0"/>
+              <a:t>datelor;</a:t>
+            </a:r>
+            <a:endParaRPr lang="en-US" sz="1400" dirty="0" smtClean="0"/>
           </a:p>
           <a:p>
             <a:pPr marL="228600" indent="-228600">
               <a:buAutoNum type="arabicPeriod"/>
             </a:pPr>
             <a:r>
-              <a:rPr lang="ro-RO" sz="1200" dirty="0" smtClean="0"/>
-              <a:t>Managementul conecțiunilor</a:t>
+              <a:rPr lang="ro-RO" sz="1400" dirty="0" smtClean="0"/>
+              <a:t>Managementul </a:t>
             </a:r>
             <a:r>
-              <a:rPr lang="en-US" sz="1200" dirty="0" smtClean="0"/>
+              <a:rPr lang="ro-RO" sz="1400" dirty="0" smtClean="0"/>
+              <a:t>conexiunilor</a:t>
+            </a:r>
+            <a:r>
+              <a:rPr lang="en-US" sz="1400" dirty="0" smtClean="0"/>
               <a:t>? </a:t>
             </a:r>
             <a:r>
-              <a:rPr lang="ro-RO" sz="1200" dirty="0" smtClean="0"/>
+              <a:rPr lang="ro-RO" sz="1400" dirty="0" smtClean="0"/>
               <a:t>Inițiere</a:t>
             </a:r>
             <a:r>
-              <a:rPr lang="en-US" sz="1200" dirty="0" smtClean="0"/>
+              <a:rPr lang="en-US" sz="1400" dirty="0" smtClean="0"/>
               <a:t>– </a:t>
             </a:r>
             <a:r>
-              <a:rPr lang="ro-RO" sz="1200" dirty="0" smtClean="0"/>
+              <a:rPr lang="ro-RO" sz="1400" dirty="0" smtClean="0"/>
               <a:t>Comunicare propriu zisă</a:t>
             </a:r>
             <a:r>
-              <a:rPr lang="en-US" sz="1200" dirty="0" smtClean="0"/>
+              <a:rPr lang="en-US" sz="1400" dirty="0" smtClean="0"/>
               <a:t> – </a:t>
             </a:r>
             <a:r>
-              <a:rPr lang="ro-RO" sz="1200" dirty="0" smtClean="0"/>
-              <a:t>Finalizare</a:t>
+              <a:rPr lang="ro-RO" sz="1400" dirty="0" smtClean="0"/>
+              <a:t>Finalizare;</a:t>
             </a:r>
-            <a:endParaRPr lang="en-US" sz="1200" dirty="0" smtClean="0"/>
+            <a:endParaRPr lang="en-US" sz="1400" dirty="0" smtClean="0"/>
           </a:p>
           <a:p>
             <a:pPr marL="228600" indent="-228600">
               <a:buAutoNum type="arabicPeriod"/>
             </a:pPr>
             <a:r>
-              <a:rPr lang="ro-RO" sz="1200" dirty="0" smtClean="0"/>
-              <a:t>Protocol comun de comunicare cu dispozitivele</a:t>
+              <a:rPr lang="ro-RO" sz="1400" dirty="0" smtClean="0"/>
+              <a:t>Protocol comun de comunicare cu </a:t>
             </a:r>
-            <a:endParaRPr lang="en-US" sz="1200" dirty="0" smtClean="0"/>
+            <a:r>
+              <a:rPr lang="ro-RO" sz="1400" dirty="0" smtClean="0"/>
+              <a:t>dispozitivele.</a:t>
+            </a:r>
+            <a:endParaRPr lang="en-US" sz="1400" dirty="0" smtClean="0"/>
           </a:p>
           <a:p>
             <a:pPr marL="228600" indent="-228600">
               <a:buAutoNum type="arabicPeriod"/>
             </a:pPr>
-            <a:endParaRPr lang="en-US" sz="1200" dirty="0" smtClean="0"/>
-          </a:p>
-          <a:p>
-            <a:pPr marL="228600" indent="-228600">
-              <a:buAutoNum type="arabicPeriod"/>
-            </a:pPr>
-            <a:endParaRPr lang="en-US" sz="1200" dirty="0" smtClean="0"/>
+            <a:endParaRPr lang="en-US" sz="1400" dirty="0" smtClean="0"/>
           </a:p>
         </p:txBody>
       </p:sp>
@@ -11974,13 +11997,13 @@
         </p:nvSpPr>
         <p:spPr>
           <a:xfrm>
-            <a:off x="6184083" y="3839303"/>
-            <a:ext cx="5550717" cy="893107"/>
+            <a:off x="6183246" y="3546553"/>
+            <a:ext cx="5886834" cy="1390335"/>
           </a:xfrm>
           <a:prstGeom prst="cloudCallout">
             <a:avLst>
-              <a:gd name="adj1" fmla="val -56864"/>
-              <a:gd name="adj2" fmla="val 70301"/>
+              <a:gd name="adj1" fmla="val -64261"/>
+              <a:gd name="adj2" fmla="val 37104"/>
             </a:avLst>
           </a:prstGeom>
         </p:spPr>
@@ -12003,35 +12026,52 @@
           <a:lstStyle/>
           <a:p>
             <a:r>
-              <a:rPr lang="ro-RO" sz="1200" dirty="0" smtClean="0"/>
-              <a:t>1. Conecțiune cu serverul prin TCP/IP</a:t>
+              <a:rPr lang="ro-RO" sz="1400" dirty="0" smtClean="0"/>
+              <a:t>1. Conecțiune cu serverul prin </a:t>
             </a:r>
-            <a:endParaRPr lang="en-US" sz="1200" dirty="0" smtClean="0"/>
+            <a:r>
+              <a:rPr lang="ro-RO" sz="1400" dirty="0" smtClean="0"/>
+              <a:t>TCP/IP;</a:t>
+            </a:r>
+            <a:endParaRPr lang="en-US" sz="1400" dirty="0" smtClean="0"/>
           </a:p>
           <a:p>
             <a:r>
-              <a:rPr lang="en-US" sz="1200" dirty="0" smtClean="0"/>
+              <a:rPr lang="en-US" sz="1400" dirty="0" smtClean="0"/>
               <a:t>2. </a:t>
             </a:r>
             <a:r>
-              <a:rPr lang="ro-RO" sz="1200" dirty="0" smtClean="0"/>
-              <a:t>Primește cereri și efectuează operații</a:t>
+              <a:rPr lang="ro-RO" sz="1400" dirty="0" smtClean="0"/>
+              <a:t>Primește cereri și efectuează </a:t>
             </a:r>
-            <a:endParaRPr lang="en-US" sz="1200" dirty="0" smtClean="0"/>
+            <a:r>
+              <a:rPr lang="ro-RO" sz="1400" dirty="0" smtClean="0"/>
+              <a:t>operații;</a:t>
+            </a:r>
+            <a:endParaRPr lang="en-US" sz="1400" dirty="0" smtClean="0"/>
           </a:p>
           <a:p>
             <a:r>
-              <a:rPr lang="en-US" sz="1200" dirty="0" smtClean="0"/>
+              <a:rPr lang="en-US" sz="1400" dirty="0" smtClean="0"/>
               <a:t>3. </a:t>
             </a:r>
             <a:r>
-              <a:rPr lang="ro-RO" sz="1200" dirty="0" smtClean="0"/>
-              <a:t>În caz de eroare, comportare adecvată și înștiintarea serverului cu un mesaj consistent și relevant.</a:t>
+              <a:rPr lang="ro-RO" sz="1400" dirty="0" smtClean="0"/>
+              <a:t>În caz de eroare, comportare adecvată și </a:t>
             </a:r>
             <a:r>
-              <a:rPr lang="en-US" sz="1200" dirty="0" smtClean="0"/>
-              <a:t>	</a:t>
+              <a:rPr lang="ro-RO" sz="1400" dirty="0" smtClean="0"/>
+              <a:t>înștiințarea </a:t>
             </a:r>
+            <a:r>
+              <a:rPr lang="ro-RO" sz="1400" dirty="0" smtClean="0"/>
+              <a:t>serverului cu un mesaj consistent și relevant</a:t>
+            </a:r>
+            <a:r>
+              <a:rPr lang="ro-RO" sz="1400" dirty="0" smtClean="0"/>
+              <a:t>.</a:t>
+            </a:r>
+            <a:endParaRPr lang="en-US" sz="1400" dirty="0" smtClean="0"/>
           </a:p>
         </p:txBody>
       </p:sp>
@@ -12418,7 +12458,7 @@
           <p:nvPr>
             <p:extLst>
               <p:ext uri="{D42A27DB-BD31-4B8C-83A1-F6EECF244321}">
-                <p14:modId xmlns:p14="http://schemas.microsoft.com/office/powerpoint/2010/main" val="3334663289"/>
+                <p14:modId xmlns:p14="http://schemas.microsoft.com/office/powerpoint/2010/main" val="4196441642"/>
               </p:ext>
             </p:extLst>
           </p:nvPr>

</xml_diff>